<commit_message>
✨ docs: update presentation file for development phase 2
</commit_message>
<xml_diff>
--- a/docs/Wokurka-Nikita_IU14141855_OOFPP_Development_Phase_2.pptx
+++ b/docs/Wokurka-Nikita_IU14141855_OOFPP_Development_Phase_2.pptx
@@ -3471,7 +3471,7 @@
           <a:p>
             <a:fld id="{B4086B64-2806-475F-A0FC-C80581FC7379}" type="datetimeFigureOut">
               <a:rPr lang="en-US" smtClean="0"/>
-              <a:t>12/21/2025</a:t>
+              <a:t>1/15/2026</a:t>
             </a:fld>
             <a:endParaRPr lang="en-US"/>
           </a:p>
@@ -3648,7 +3648,7 @@
           <a:p>
             <a:fld id="{1DEC01A7-C48D-4F52-9AF5-98850FAFF68B}" type="datetimeFigureOut">
               <a:rPr lang="en-US" smtClean="0"/>
-              <a:t>12/21/2025</a:t>
+              <a:t>1/15/2026</a:t>
             </a:fld>
             <a:endParaRPr lang="en-US"/>
           </a:p>
@@ -4542,7 +4542,7 @@
           <a:p>
             <a:fld id="{331BB52A-1119-4C62-AB93-D9C1ED94E901}" type="datetimeFigureOut">
               <a:rPr lang="en-US" smtClean="0"/>
-              <a:t>12/21/2025</a:t>
+              <a:t>1/15/2026</a:t>
             </a:fld>
             <a:endParaRPr lang="en-US"/>
           </a:p>
@@ -4838,7 +4838,7 @@
           <a:p>
             <a:fld id="{331BB52A-1119-4C62-AB93-D9C1ED94E901}" type="datetimeFigureOut">
               <a:rPr lang="en-US" smtClean="0"/>
-              <a:t>12/21/2025</a:t>
+              <a:t>1/15/2026</a:t>
             </a:fld>
             <a:endParaRPr lang="en-US"/>
           </a:p>
@@ -5086,7 +5086,7 @@
           <a:p>
             <a:fld id="{331BB52A-1119-4C62-AB93-D9C1ED94E901}" type="datetimeFigureOut">
               <a:rPr lang="en-US" smtClean="0"/>
-              <a:t>12/21/2025</a:t>
+              <a:t>1/15/2026</a:t>
             </a:fld>
             <a:endParaRPr lang="en-US"/>
           </a:p>
@@ -5626,7 +5626,7 @@
           <a:p>
             <a:fld id="{331BB52A-1119-4C62-AB93-D9C1ED94E901}" type="datetimeFigureOut">
               <a:rPr lang="en-US" smtClean="0"/>
-              <a:t>12/21/2025</a:t>
+              <a:t>1/15/2026</a:t>
             </a:fld>
             <a:endParaRPr lang="en-US"/>
           </a:p>
@@ -5874,7 +5874,7 @@
           <a:p>
             <a:fld id="{331BB52A-1119-4C62-AB93-D9C1ED94E901}" type="datetimeFigureOut">
               <a:rPr lang="en-US" smtClean="0"/>
-              <a:t>12/21/2025</a:t>
+              <a:t>1/15/2026</a:t>
             </a:fld>
             <a:endParaRPr lang="en-US"/>
           </a:p>
@@ -6406,7 +6406,7 @@
           <a:p>
             <a:fld id="{331BB52A-1119-4C62-AB93-D9C1ED94E901}" type="datetimeFigureOut">
               <a:rPr lang="en-US" smtClean="0"/>
-              <a:t>12/21/2025</a:t>
+              <a:t>1/15/2026</a:t>
             </a:fld>
             <a:endParaRPr lang="en-US"/>
           </a:p>
@@ -6703,7 +6703,7 @@
           <a:p>
             <a:fld id="{331BB52A-1119-4C62-AB93-D9C1ED94E901}" type="datetimeFigureOut">
               <a:rPr lang="en-US" smtClean="0"/>
-              <a:t>12/21/2025</a:t>
+              <a:t>1/15/2026</a:t>
             </a:fld>
             <a:endParaRPr lang="en-US"/>
           </a:p>
@@ -6877,7 +6877,7 @@
           <a:p>
             <a:fld id="{331BB52A-1119-4C62-AB93-D9C1ED94E901}" type="datetimeFigureOut">
               <a:rPr lang="en-US" smtClean="0"/>
-              <a:t>12/21/2025</a:t>
+              <a:t>1/15/2026</a:t>
             </a:fld>
             <a:endParaRPr lang="en-US"/>
           </a:p>
@@ -7057,7 +7057,7 @@
           <a:p>
             <a:fld id="{331BB52A-1119-4C62-AB93-D9C1ED94E901}" type="datetimeFigureOut">
               <a:rPr lang="en-US" smtClean="0"/>
-              <a:t>12/21/2025</a:t>
+              <a:t>1/15/2026</a:t>
             </a:fld>
             <a:endParaRPr lang="en-US"/>
           </a:p>
@@ -7265,7 +7265,7 @@
           <a:p>
             <a:fld id="{E778D16E-5DD9-40F0-A001-9BF546866B5B}" type="datetimeFigureOut">
               <a:rPr lang="en-US" smtClean="0"/>
-              <a:t>12/21/2025</a:t>
+              <a:t>1/15/2026</a:t>
             </a:fld>
             <a:endParaRPr lang="en-US"/>
           </a:p>
@@ -7463,7 +7463,7 @@
           <a:p>
             <a:fld id="{E778D16E-5DD9-40F0-A001-9BF546866B5B}" type="datetimeFigureOut">
               <a:rPr lang="en-US" smtClean="0"/>
-              <a:t>12/21/2025</a:t>
+              <a:t>1/15/2026</a:t>
             </a:fld>
             <a:endParaRPr lang="en-US"/>
           </a:p>
@@ -7645,7 +7645,7 @@
           <a:p>
             <a:fld id="{331BB52A-1119-4C62-AB93-D9C1ED94E901}" type="datetimeFigureOut">
               <a:rPr lang="en-US" smtClean="0"/>
-              <a:t>12/21/2025</a:t>
+              <a:t>1/15/2026</a:t>
             </a:fld>
             <a:endParaRPr lang="en-US"/>
           </a:p>
@@ -7913,7 +7913,7 @@
           <a:p>
             <a:fld id="{E778D16E-5DD9-40F0-A001-9BF546866B5B}" type="datetimeFigureOut">
               <a:rPr lang="en-US" smtClean="0"/>
-              <a:t>12/21/2025</a:t>
+              <a:t>1/15/2026</a:t>
             </a:fld>
             <a:endParaRPr lang="en-US"/>
           </a:p>
@@ -8178,7 +8178,7 @@
           <a:p>
             <a:fld id="{E778D16E-5DD9-40F0-A001-9BF546866B5B}" type="datetimeFigureOut">
               <a:rPr lang="en-US" smtClean="0"/>
-              <a:t>12/21/2025</a:t>
+              <a:t>1/15/2026</a:t>
             </a:fld>
             <a:endParaRPr lang="en-US"/>
           </a:p>
@@ -8590,7 +8590,7 @@
           <a:p>
             <a:fld id="{E778D16E-5DD9-40F0-A001-9BF546866B5B}" type="datetimeFigureOut">
               <a:rPr lang="en-US" smtClean="0"/>
-              <a:t>12/21/2025</a:t>
+              <a:t>1/15/2026</a:t>
             </a:fld>
             <a:endParaRPr lang="en-US"/>
           </a:p>
@@ -8731,7 +8731,7 @@
           <a:p>
             <a:fld id="{E778D16E-5DD9-40F0-A001-9BF546866B5B}" type="datetimeFigureOut">
               <a:rPr lang="en-US" smtClean="0"/>
-              <a:t>12/21/2025</a:t>
+              <a:t>1/15/2026</a:t>
             </a:fld>
             <a:endParaRPr lang="en-US"/>
           </a:p>
@@ -8844,7 +8844,7 @@
           <a:p>
             <a:fld id="{E778D16E-5DD9-40F0-A001-9BF546866B5B}" type="datetimeFigureOut">
               <a:rPr lang="en-US" smtClean="0"/>
-              <a:t>12/21/2025</a:t>
+              <a:t>1/15/2026</a:t>
             </a:fld>
             <a:endParaRPr lang="en-US"/>
           </a:p>
@@ -9155,7 +9155,7 @@
           <a:p>
             <a:fld id="{E778D16E-5DD9-40F0-A001-9BF546866B5B}" type="datetimeFigureOut">
               <a:rPr lang="en-US" smtClean="0"/>
-              <a:t>12/21/2025</a:t>
+              <a:t>1/15/2026</a:t>
             </a:fld>
             <a:endParaRPr lang="en-US"/>
           </a:p>
@@ -9443,7 +9443,7 @@
           <a:p>
             <a:fld id="{E778D16E-5DD9-40F0-A001-9BF546866B5B}" type="datetimeFigureOut">
               <a:rPr lang="en-US" smtClean="0"/>
-              <a:t>12/21/2025</a:t>
+              <a:t>1/15/2026</a:t>
             </a:fld>
             <a:endParaRPr lang="en-US"/>
           </a:p>
@@ -9641,7 +9641,7 @@
           <a:p>
             <a:fld id="{E778D16E-5DD9-40F0-A001-9BF546866B5B}" type="datetimeFigureOut">
               <a:rPr lang="en-US" smtClean="0"/>
-              <a:t>12/21/2025</a:t>
+              <a:t>1/15/2026</a:t>
             </a:fld>
             <a:endParaRPr lang="en-US"/>
           </a:p>
@@ -9849,7 +9849,7 @@
           <a:p>
             <a:fld id="{E778D16E-5DD9-40F0-A001-9BF546866B5B}" type="datetimeFigureOut">
               <a:rPr lang="en-US" smtClean="0"/>
-              <a:t>12/21/2025</a:t>
+              <a:t>1/15/2026</a:t>
             </a:fld>
             <a:endParaRPr lang="en-US"/>
           </a:p>
@@ -10069,7 +10069,7 @@
           <a:p>
             <a:fld id="{A7AC20F4-BAFA-45E4-A9C8-C2EC2EED0F56}" type="datetimeFigureOut">
               <a:rPr lang="en-US" smtClean="0"/>
-              <a:t>12/21/2025</a:t>
+              <a:t>1/15/2026</a:t>
             </a:fld>
             <a:endParaRPr lang="en-US"/>
           </a:p>
@@ -10327,7 +10327,7 @@
           <a:p>
             <a:fld id="{331BB52A-1119-4C62-AB93-D9C1ED94E901}" type="datetimeFigureOut">
               <a:rPr lang="en-US" smtClean="0"/>
-              <a:t>12/21/2025</a:t>
+              <a:t>1/15/2026</a:t>
             </a:fld>
             <a:endParaRPr lang="en-US"/>
           </a:p>
@@ -10513,7 +10513,7 @@
           <a:p>
             <a:fld id="{A7AC20F4-BAFA-45E4-A9C8-C2EC2EED0F56}" type="datetimeFigureOut">
               <a:rPr lang="en-US" smtClean="0"/>
-              <a:t>12/21/2025</a:t>
+              <a:t>1/15/2026</a:t>
             </a:fld>
             <a:endParaRPr lang="en-US"/>
           </a:p>
@@ -10788,7 +10788,7 @@
           <a:p>
             <a:fld id="{A7AC20F4-BAFA-45E4-A9C8-C2EC2EED0F56}" type="datetimeFigureOut">
               <a:rPr lang="en-US" smtClean="0"/>
-              <a:t>12/21/2025</a:t>
+              <a:t>1/15/2026</a:t>
             </a:fld>
             <a:endParaRPr lang="en-US"/>
           </a:p>
@@ -11053,7 +11053,7 @@
           <a:p>
             <a:fld id="{A7AC20F4-BAFA-45E4-A9C8-C2EC2EED0F56}" type="datetimeFigureOut">
               <a:rPr lang="en-US" smtClean="0"/>
-              <a:t>12/21/2025</a:t>
+              <a:t>1/15/2026</a:t>
             </a:fld>
             <a:endParaRPr lang="en-US"/>
           </a:p>
@@ -11465,7 +11465,7 @@
           <a:p>
             <a:fld id="{A7AC20F4-BAFA-45E4-A9C8-C2EC2EED0F56}" type="datetimeFigureOut">
               <a:rPr lang="en-US" smtClean="0"/>
-              <a:t>12/21/2025</a:t>
+              <a:t>1/15/2026</a:t>
             </a:fld>
             <a:endParaRPr lang="en-US"/>
           </a:p>
@@ -11606,7 +11606,7 @@
           <a:p>
             <a:fld id="{A7AC20F4-BAFA-45E4-A9C8-C2EC2EED0F56}" type="datetimeFigureOut">
               <a:rPr lang="en-US" smtClean="0"/>
-              <a:t>12/21/2025</a:t>
+              <a:t>1/15/2026</a:t>
             </a:fld>
             <a:endParaRPr lang="en-US"/>
           </a:p>
@@ -11719,7 +11719,7 @@
           <a:p>
             <a:fld id="{A7AC20F4-BAFA-45E4-A9C8-C2EC2EED0F56}" type="datetimeFigureOut">
               <a:rPr lang="en-US" smtClean="0"/>
-              <a:t>12/21/2025</a:t>
+              <a:t>1/15/2026</a:t>
             </a:fld>
             <a:endParaRPr lang="en-US"/>
           </a:p>
@@ -12030,7 +12030,7 @@
           <a:p>
             <a:fld id="{A7AC20F4-BAFA-45E4-A9C8-C2EC2EED0F56}" type="datetimeFigureOut">
               <a:rPr lang="en-US" smtClean="0"/>
-              <a:t>12/21/2025</a:t>
+              <a:t>1/15/2026</a:t>
             </a:fld>
             <a:endParaRPr lang="en-US"/>
           </a:p>
@@ -12318,7 +12318,7 @@
           <a:p>
             <a:fld id="{A7AC20F4-BAFA-45E4-A9C8-C2EC2EED0F56}" type="datetimeFigureOut">
               <a:rPr lang="en-US" smtClean="0"/>
-              <a:t>12/21/2025</a:t>
+              <a:t>1/15/2026</a:t>
             </a:fld>
             <a:endParaRPr lang="en-US"/>
           </a:p>
@@ -12516,7 +12516,7 @@
           <a:p>
             <a:fld id="{A7AC20F4-BAFA-45E4-A9C8-C2EC2EED0F56}" type="datetimeFigureOut">
               <a:rPr lang="en-US" smtClean="0"/>
-              <a:t>12/21/2025</a:t>
+              <a:t>1/15/2026</a:t>
             </a:fld>
             <a:endParaRPr lang="en-US"/>
           </a:p>
@@ -12724,7 +12724,7 @@
           <a:p>
             <a:fld id="{A7AC20F4-BAFA-45E4-A9C8-C2EC2EED0F56}" type="datetimeFigureOut">
               <a:rPr lang="en-US" smtClean="0"/>
-              <a:t>12/21/2025</a:t>
+              <a:t>1/15/2026</a:t>
             </a:fld>
             <a:endParaRPr lang="en-US"/>
           </a:p>
@@ -13033,7 +13033,7 @@
           <a:p>
             <a:fld id="{331BB52A-1119-4C62-AB93-D9C1ED94E901}" type="datetimeFigureOut">
               <a:rPr lang="en-US" smtClean="0"/>
-              <a:t>12/21/2025</a:t>
+              <a:t>1/15/2026</a:t>
             </a:fld>
             <a:endParaRPr lang="en-US"/>
           </a:p>
@@ -13475,7 +13475,7 @@
           <a:p>
             <a:fld id="{331BB52A-1119-4C62-AB93-D9C1ED94E901}" type="datetimeFigureOut">
               <a:rPr lang="en-US" smtClean="0"/>
-              <a:t>12/21/2025</a:t>
+              <a:t>1/15/2026</a:t>
             </a:fld>
             <a:endParaRPr lang="en-US"/>
           </a:p>
@@ -13593,7 +13593,7 @@
           <a:p>
             <a:fld id="{331BB52A-1119-4C62-AB93-D9C1ED94E901}" type="datetimeFigureOut">
               <a:rPr lang="en-US" smtClean="0"/>
-              <a:t>12/21/2025</a:t>
+              <a:t>1/15/2026</a:t>
             </a:fld>
             <a:endParaRPr lang="en-US"/>
           </a:p>
@@ -13688,7 +13688,7 @@
           <a:p>
             <a:fld id="{331BB52A-1119-4C62-AB93-D9C1ED94E901}" type="datetimeFigureOut">
               <a:rPr lang="en-US" smtClean="0"/>
-              <a:t>12/21/2025</a:t>
+              <a:t>1/15/2026</a:t>
             </a:fld>
             <a:endParaRPr lang="en-US"/>
           </a:p>
@@ -13971,7 +13971,7 @@
           <a:p>
             <a:fld id="{331BB52A-1119-4C62-AB93-D9C1ED94E901}" type="datetimeFigureOut">
               <a:rPr lang="en-US" smtClean="0"/>
-              <a:t>12/21/2025</a:t>
+              <a:t>1/15/2026</a:t>
             </a:fld>
             <a:endParaRPr lang="en-US"/>
           </a:p>
@@ -14262,7 +14262,7 @@
           <a:p>
             <a:fld id="{331BB52A-1119-4C62-AB93-D9C1ED94E901}" type="datetimeFigureOut">
               <a:rPr lang="en-US" smtClean="0"/>
-              <a:t>12/21/2025</a:t>
+              <a:t>1/15/2026</a:t>
             </a:fld>
             <a:endParaRPr lang="en-US"/>
           </a:p>
@@ -14833,7 +14833,7 @@
           <a:p>
             <a:fld id="{331BB52A-1119-4C62-AB93-D9C1ED94E901}" type="datetimeFigureOut">
               <a:rPr lang="en-US" smtClean="0"/>
-              <a:t>12/21/2025</a:t>
+              <a:t>1/15/2026</a:t>
             </a:fld>
             <a:endParaRPr lang="en-US"/>
           </a:p>
@@ -15515,7 +15515,7 @@
           <a:p>
             <a:fld id="{E778D16E-5DD9-40F0-A001-9BF546866B5B}" type="datetimeFigureOut">
               <a:rPr lang="en-US" smtClean="0"/>
-              <a:t>12/21/2025</a:t>
+              <a:t>1/15/2026</a:t>
             </a:fld>
             <a:endParaRPr lang="en-US"/>
           </a:p>
@@ -16083,7 +16083,7 @@
           <a:p>
             <a:fld id="{A7AC20F4-BAFA-45E4-A9C8-C2EC2EED0F56}" type="datetimeFigureOut">
               <a:rPr lang="en-US" smtClean="0"/>
-              <a:t>12/21/2025</a:t>
+              <a:t>1/15/2026</a:t>
             </a:fld>
             <a:endParaRPr lang="en-US"/>
           </a:p>
@@ -20054,10 +20054,10 @@
       </p:sp>
       <p:pic>
         <p:nvPicPr>
-          <p:cNvPr id="6" name="Picture 5">
+          <p:cNvPr id="13" name="Picture 12">
             <a:extLst>
               <a:ext uri="{FF2B5EF4-FFF2-40B4-BE49-F238E27FC236}">
-                <a16:creationId xmlns:a16="http://schemas.microsoft.com/office/drawing/2014/main" id="{ED1842EF-12A5-E9CA-8D37-6F97D00F5691}"/>
+                <a16:creationId xmlns:a16="http://schemas.microsoft.com/office/drawing/2014/main" id="{1C1F47A9-3BD4-8ACC-3C1E-6837FCC5E5F7}"/>
               </a:ext>
             </a:extLst>
           </p:cNvPr>
@@ -20074,8 +20074,8 @@
         </p:blipFill>
         <p:spPr>
           <a:xfrm>
-            <a:off x="1905000" y="1950897"/>
-            <a:ext cx="4666980" cy="4211109"/>
+            <a:off x="6824473" y="1919641"/>
+            <a:ext cx="4579440" cy="2982560"/>
           </a:xfrm>
           <a:prstGeom prst="rect">
             <a:avLst/>
@@ -20084,10 +20084,10 @@
       </p:pic>
       <p:pic>
         <p:nvPicPr>
-          <p:cNvPr id="8" name="Picture 7">
+          <p:cNvPr id="15" name="Picture 14">
             <a:extLst>
               <a:ext uri="{FF2B5EF4-FFF2-40B4-BE49-F238E27FC236}">
-                <a16:creationId xmlns:a16="http://schemas.microsoft.com/office/drawing/2014/main" id="{1F50B488-B66E-EC6B-5BBE-8C247A035464}"/>
+                <a16:creationId xmlns:a16="http://schemas.microsoft.com/office/drawing/2014/main" id="{7CDD222F-723D-1E51-34F8-E5DBD5F5D9A0}"/>
               </a:ext>
             </a:extLst>
           </p:cNvPr>
@@ -20104,49 +20104,14 @@
         </p:blipFill>
         <p:spPr>
           <a:xfrm>
-            <a:off x="6876757" y="1950896"/>
-            <a:ext cx="4803929" cy="2232483"/>
+            <a:off x="1905000" y="1919641"/>
+            <a:ext cx="4443979" cy="4633559"/>
           </a:xfrm>
           <a:prstGeom prst="rect">
             <a:avLst/>
           </a:prstGeom>
         </p:spPr>
       </p:pic>
-      <p:sp>
-        <p:nvSpPr>
-          <p:cNvPr id="3" name="TextBox 2">
-            <a:extLst>
-              <a:ext uri="{FF2B5EF4-FFF2-40B4-BE49-F238E27FC236}">
-                <a16:creationId xmlns:a16="http://schemas.microsoft.com/office/drawing/2014/main" id="{5888DC1A-F10F-23B0-4122-84A4D9795E20}"/>
-              </a:ext>
-            </a:extLst>
-          </p:cNvPr>
-          <p:cNvSpPr txBox="1"/>
-          <p:nvPr/>
-        </p:nvSpPr>
-        <p:spPr>
-          <a:xfrm>
-            <a:off x="6835699" y="4438113"/>
-            <a:ext cx="4014753" cy="369332"/>
-          </a:xfrm>
-          <a:prstGeom prst="rect">
-            <a:avLst/>
-          </a:prstGeom>
-          <a:noFill/>
-        </p:spPr>
-        <p:txBody>
-          <a:bodyPr wrap="none" rtlCol="0">
-            <a:spAutoFit/>
-          </a:bodyPr>
-          <a:lstStyle/>
-          <a:p>
-            <a:r>
-              <a:rPr lang="en-US" dirty="0"/>
-              <a:t>Full instructions available in README.md</a:t>
-            </a:r>
-          </a:p>
-        </p:txBody>
-      </p:sp>
     </p:spTree>
     <p:extLst>
       <p:ext uri="{BB962C8B-B14F-4D97-AF65-F5344CB8AC3E}">

</xml_diff>

<commit_message>
✨ feat(validators): add input validators for habit name and description ✨ feat(actions): enhance habit addition with validation and error handling ✨ chore(docs): add development phase 2 presentation and remove temporary files ✨ test(validators): implement unit tests for input validators
</commit_message>
<xml_diff>
--- a/docs/Wokurka-Nikita_IU14141855_OOFPP_Development_Phase_2.pptx
+++ b/docs/Wokurka-Nikita_IU14141855_OOFPP_Development_Phase_2.pptx
@@ -3471,7 +3471,7 @@
           <a:p>
             <a:fld id="{B4086B64-2806-475F-A0FC-C80581FC7379}" type="datetimeFigureOut">
               <a:rPr lang="en-US" smtClean="0"/>
-              <a:t>1/15/2026</a:t>
+              <a:t>1/17/2026</a:t>
             </a:fld>
             <a:endParaRPr lang="en-US"/>
           </a:p>
@@ -3648,7 +3648,7 @@
           <a:p>
             <a:fld id="{1DEC01A7-C48D-4F52-9AF5-98850FAFF68B}" type="datetimeFigureOut">
               <a:rPr lang="en-US" smtClean="0"/>
-              <a:t>1/15/2026</a:t>
+              <a:t>1/17/2026</a:t>
             </a:fld>
             <a:endParaRPr lang="en-US"/>
           </a:p>
@@ -4542,7 +4542,7 @@
           <a:p>
             <a:fld id="{331BB52A-1119-4C62-AB93-D9C1ED94E901}" type="datetimeFigureOut">
               <a:rPr lang="en-US" smtClean="0"/>
-              <a:t>1/15/2026</a:t>
+              <a:t>1/17/2026</a:t>
             </a:fld>
             <a:endParaRPr lang="en-US"/>
           </a:p>
@@ -4838,7 +4838,7 @@
           <a:p>
             <a:fld id="{331BB52A-1119-4C62-AB93-D9C1ED94E901}" type="datetimeFigureOut">
               <a:rPr lang="en-US" smtClean="0"/>
-              <a:t>1/15/2026</a:t>
+              <a:t>1/17/2026</a:t>
             </a:fld>
             <a:endParaRPr lang="en-US"/>
           </a:p>
@@ -5086,7 +5086,7 @@
           <a:p>
             <a:fld id="{331BB52A-1119-4C62-AB93-D9C1ED94E901}" type="datetimeFigureOut">
               <a:rPr lang="en-US" smtClean="0"/>
-              <a:t>1/15/2026</a:t>
+              <a:t>1/17/2026</a:t>
             </a:fld>
             <a:endParaRPr lang="en-US"/>
           </a:p>
@@ -5626,7 +5626,7 @@
           <a:p>
             <a:fld id="{331BB52A-1119-4C62-AB93-D9C1ED94E901}" type="datetimeFigureOut">
               <a:rPr lang="en-US" smtClean="0"/>
-              <a:t>1/15/2026</a:t>
+              <a:t>1/17/2026</a:t>
             </a:fld>
             <a:endParaRPr lang="en-US"/>
           </a:p>
@@ -5874,7 +5874,7 @@
           <a:p>
             <a:fld id="{331BB52A-1119-4C62-AB93-D9C1ED94E901}" type="datetimeFigureOut">
               <a:rPr lang="en-US" smtClean="0"/>
-              <a:t>1/15/2026</a:t>
+              <a:t>1/17/2026</a:t>
             </a:fld>
             <a:endParaRPr lang="en-US"/>
           </a:p>
@@ -6406,7 +6406,7 @@
           <a:p>
             <a:fld id="{331BB52A-1119-4C62-AB93-D9C1ED94E901}" type="datetimeFigureOut">
               <a:rPr lang="en-US" smtClean="0"/>
-              <a:t>1/15/2026</a:t>
+              <a:t>1/17/2026</a:t>
             </a:fld>
             <a:endParaRPr lang="en-US"/>
           </a:p>
@@ -6703,7 +6703,7 @@
           <a:p>
             <a:fld id="{331BB52A-1119-4C62-AB93-D9C1ED94E901}" type="datetimeFigureOut">
               <a:rPr lang="en-US" smtClean="0"/>
-              <a:t>1/15/2026</a:t>
+              <a:t>1/17/2026</a:t>
             </a:fld>
             <a:endParaRPr lang="en-US"/>
           </a:p>
@@ -6877,7 +6877,7 @@
           <a:p>
             <a:fld id="{331BB52A-1119-4C62-AB93-D9C1ED94E901}" type="datetimeFigureOut">
               <a:rPr lang="en-US" smtClean="0"/>
-              <a:t>1/15/2026</a:t>
+              <a:t>1/17/2026</a:t>
             </a:fld>
             <a:endParaRPr lang="en-US"/>
           </a:p>
@@ -7057,7 +7057,7 @@
           <a:p>
             <a:fld id="{331BB52A-1119-4C62-AB93-D9C1ED94E901}" type="datetimeFigureOut">
               <a:rPr lang="en-US" smtClean="0"/>
-              <a:t>1/15/2026</a:t>
+              <a:t>1/17/2026</a:t>
             </a:fld>
             <a:endParaRPr lang="en-US"/>
           </a:p>
@@ -7265,7 +7265,7 @@
           <a:p>
             <a:fld id="{E778D16E-5DD9-40F0-A001-9BF546866B5B}" type="datetimeFigureOut">
               <a:rPr lang="en-US" smtClean="0"/>
-              <a:t>1/15/2026</a:t>
+              <a:t>1/17/2026</a:t>
             </a:fld>
             <a:endParaRPr lang="en-US"/>
           </a:p>
@@ -7463,7 +7463,7 @@
           <a:p>
             <a:fld id="{E778D16E-5DD9-40F0-A001-9BF546866B5B}" type="datetimeFigureOut">
               <a:rPr lang="en-US" smtClean="0"/>
-              <a:t>1/15/2026</a:t>
+              <a:t>1/17/2026</a:t>
             </a:fld>
             <a:endParaRPr lang="en-US"/>
           </a:p>
@@ -7645,7 +7645,7 @@
           <a:p>
             <a:fld id="{331BB52A-1119-4C62-AB93-D9C1ED94E901}" type="datetimeFigureOut">
               <a:rPr lang="en-US" smtClean="0"/>
-              <a:t>1/15/2026</a:t>
+              <a:t>1/17/2026</a:t>
             </a:fld>
             <a:endParaRPr lang="en-US"/>
           </a:p>
@@ -7913,7 +7913,7 @@
           <a:p>
             <a:fld id="{E778D16E-5DD9-40F0-A001-9BF546866B5B}" type="datetimeFigureOut">
               <a:rPr lang="en-US" smtClean="0"/>
-              <a:t>1/15/2026</a:t>
+              <a:t>1/17/2026</a:t>
             </a:fld>
             <a:endParaRPr lang="en-US"/>
           </a:p>
@@ -8178,7 +8178,7 @@
           <a:p>
             <a:fld id="{E778D16E-5DD9-40F0-A001-9BF546866B5B}" type="datetimeFigureOut">
               <a:rPr lang="en-US" smtClean="0"/>
-              <a:t>1/15/2026</a:t>
+              <a:t>1/17/2026</a:t>
             </a:fld>
             <a:endParaRPr lang="en-US"/>
           </a:p>
@@ -8590,7 +8590,7 @@
           <a:p>
             <a:fld id="{E778D16E-5DD9-40F0-A001-9BF546866B5B}" type="datetimeFigureOut">
               <a:rPr lang="en-US" smtClean="0"/>
-              <a:t>1/15/2026</a:t>
+              <a:t>1/17/2026</a:t>
             </a:fld>
             <a:endParaRPr lang="en-US"/>
           </a:p>
@@ -8731,7 +8731,7 @@
           <a:p>
             <a:fld id="{E778D16E-5DD9-40F0-A001-9BF546866B5B}" type="datetimeFigureOut">
               <a:rPr lang="en-US" smtClean="0"/>
-              <a:t>1/15/2026</a:t>
+              <a:t>1/17/2026</a:t>
             </a:fld>
             <a:endParaRPr lang="en-US"/>
           </a:p>
@@ -8844,7 +8844,7 @@
           <a:p>
             <a:fld id="{E778D16E-5DD9-40F0-A001-9BF546866B5B}" type="datetimeFigureOut">
               <a:rPr lang="en-US" smtClean="0"/>
-              <a:t>1/15/2026</a:t>
+              <a:t>1/17/2026</a:t>
             </a:fld>
             <a:endParaRPr lang="en-US"/>
           </a:p>
@@ -9155,7 +9155,7 @@
           <a:p>
             <a:fld id="{E778D16E-5DD9-40F0-A001-9BF546866B5B}" type="datetimeFigureOut">
               <a:rPr lang="en-US" smtClean="0"/>
-              <a:t>1/15/2026</a:t>
+              <a:t>1/17/2026</a:t>
             </a:fld>
             <a:endParaRPr lang="en-US"/>
           </a:p>
@@ -9443,7 +9443,7 @@
           <a:p>
             <a:fld id="{E778D16E-5DD9-40F0-A001-9BF546866B5B}" type="datetimeFigureOut">
               <a:rPr lang="en-US" smtClean="0"/>
-              <a:t>1/15/2026</a:t>
+              <a:t>1/17/2026</a:t>
             </a:fld>
             <a:endParaRPr lang="en-US"/>
           </a:p>
@@ -9641,7 +9641,7 @@
           <a:p>
             <a:fld id="{E778D16E-5DD9-40F0-A001-9BF546866B5B}" type="datetimeFigureOut">
               <a:rPr lang="en-US" smtClean="0"/>
-              <a:t>1/15/2026</a:t>
+              <a:t>1/17/2026</a:t>
             </a:fld>
             <a:endParaRPr lang="en-US"/>
           </a:p>
@@ -9849,7 +9849,7 @@
           <a:p>
             <a:fld id="{E778D16E-5DD9-40F0-A001-9BF546866B5B}" type="datetimeFigureOut">
               <a:rPr lang="en-US" smtClean="0"/>
-              <a:t>1/15/2026</a:t>
+              <a:t>1/17/2026</a:t>
             </a:fld>
             <a:endParaRPr lang="en-US"/>
           </a:p>
@@ -10069,7 +10069,7 @@
           <a:p>
             <a:fld id="{A7AC20F4-BAFA-45E4-A9C8-C2EC2EED0F56}" type="datetimeFigureOut">
               <a:rPr lang="en-US" smtClean="0"/>
-              <a:t>1/15/2026</a:t>
+              <a:t>1/17/2026</a:t>
             </a:fld>
             <a:endParaRPr lang="en-US"/>
           </a:p>
@@ -10327,7 +10327,7 @@
           <a:p>
             <a:fld id="{331BB52A-1119-4C62-AB93-D9C1ED94E901}" type="datetimeFigureOut">
               <a:rPr lang="en-US" smtClean="0"/>
-              <a:t>1/15/2026</a:t>
+              <a:t>1/17/2026</a:t>
             </a:fld>
             <a:endParaRPr lang="en-US"/>
           </a:p>
@@ -10513,7 +10513,7 @@
           <a:p>
             <a:fld id="{A7AC20F4-BAFA-45E4-A9C8-C2EC2EED0F56}" type="datetimeFigureOut">
               <a:rPr lang="en-US" smtClean="0"/>
-              <a:t>1/15/2026</a:t>
+              <a:t>1/17/2026</a:t>
             </a:fld>
             <a:endParaRPr lang="en-US"/>
           </a:p>
@@ -10788,7 +10788,7 @@
           <a:p>
             <a:fld id="{A7AC20F4-BAFA-45E4-A9C8-C2EC2EED0F56}" type="datetimeFigureOut">
               <a:rPr lang="en-US" smtClean="0"/>
-              <a:t>1/15/2026</a:t>
+              <a:t>1/17/2026</a:t>
             </a:fld>
             <a:endParaRPr lang="en-US"/>
           </a:p>
@@ -11053,7 +11053,7 @@
           <a:p>
             <a:fld id="{A7AC20F4-BAFA-45E4-A9C8-C2EC2EED0F56}" type="datetimeFigureOut">
               <a:rPr lang="en-US" smtClean="0"/>
-              <a:t>1/15/2026</a:t>
+              <a:t>1/17/2026</a:t>
             </a:fld>
             <a:endParaRPr lang="en-US"/>
           </a:p>
@@ -11465,7 +11465,7 @@
           <a:p>
             <a:fld id="{A7AC20F4-BAFA-45E4-A9C8-C2EC2EED0F56}" type="datetimeFigureOut">
               <a:rPr lang="en-US" smtClean="0"/>
-              <a:t>1/15/2026</a:t>
+              <a:t>1/17/2026</a:t>
             </a:fld>
             <a:endParaRPr lang="en-US"/>
           </a:p>
@@ -11606,7 +11606,7 @@
           <a:p>
             <a:fld id="{A7AC20F4-BAFA-45E4-A9C8-C2EC2EED0F56}" type="datetimeFigureOut">
               <a:rPr lang="en-US" smtClean="0"/>
-              <a:t>1/15/2026</a:t>
+              <a:t>1/17/2026</a:t>
             </a:fld>
             <a:endParaRPr lang="en-US"/>
           </a:p>
@@ -11719,7 +11719,7 @@
           <a:p>
             <a:fld id="{A7AC20F4-BAFA-45E4-A9C8-C2EC2EED0F56}" type="datetimeFigureOut">
               <a:rPr lang="en-US" smtClean="0"/>
-              <a:t>1/15/2026</a:t>
+              <a:t>1/17/2026</a:t>
             </a:fld>
             <a:endParaRPr lang="en-US"/>
           </a:p>
@@ -12030,7 +12030,7 @@
           <a:p>
             <a:fld id="{A7AC20F4-BAFA-45E4-A9C8-C2EC2EED0F56}" type="datetimeFigureOut">
               <a:rPr lang="en-US" smtClean="0"/>
-              <a:t>1/15/2026</a:t>
+              <a:t>1/17/2026</a:t>
             </a:fld>
             <a:endParaRPr lang="en-US"/>
           </a:p>
@@ -12318,7 +12318,7 @@
           <a:p>
             <a:fld id="{A7AC20F4-BAFA-45E4-A9C8-C2EC2EED0F56}" type="datetimeFigureOut">
               <a:rPr lang="en-US" smtClean="0"/>
-              <a:t>1/15/2026</a:t>
+              <a:t>1/17/2026</a:t>
             </a:fld>
             <a:endParaRPr lang="en-US"/>
           </a:p>
@@ -12516,7 +12516,7 @@
           <a:p>
             <a:fld id="{A7AC20F4-BAFA-45E4-A9C8-C2EC2EED0F56}" type="datetimeFigureOut">
               <a:rPr lang="en-US" smtClean="0"/>
-              <a:t>1/15/2026</a:t>
+              <a:t>1/17/2026</a:t>
             </a:fld>
             <a:endParaRPr lang="en-US"/>
           </a:p>
@@ -12724,7 +12724,7 @@
           <a:p>
             <a:fld id="{A7AC20F4-BAFA-45E4-A9C8-C2EC2EED0F56}" type="datetimeFigureOut">
               <a:rPr lang="en-US" smtClean="0"/>
-              <a:t>1/15/2026</a:t>
+              <a:t>1/17/2026</a:t>
             </a:fld>
             <a:endParaRPr lang="en-US"/>
           </a:p>
@@ -13033,7 +13033,7 @@
           <a:p>
             <a:fld id="{331BB52A-1119-4C62-AB93-D9C1ED94E901}" type="datetimeFigureOut">
               <a:rPr lang="en-US" smtClean="0"/>
-              <a:t>1/15/2026</a:t>
+              <a:t>1/17/2026</a:t>
             </a:fld>
             <a:endParaRPr lang="en-US"/>
           </a:p>
@@ -13475,7 +13475,7 @@
           <a:p>
             <a:fld id="{331BB52A-1119-4C62-AB93-D9C1ED94E901}" type="datetimeFigureOut">
               <a:rPr lang="en-US" smtClean="0"/>
-              <a:t>1/15/2026</a:t>
+              <a:t>1/17/2026</a:t>
             </a:fld>
             <a:endParaRPr lang="en-US"/>
           </a:p>
@@ -13593,7 +13593,7 @@
           <a:p>
             <a:fld id="{331BB52A-1119-4C62-AB93-D9C1ED94E901}" type="datetimeFigureOut">
               <a:rPr lang="en-US" smtClean="0"/>
-              <a:t>1/15/2026</a:t>
+              <a:t>1/17/2026</a:t>
             </a:fld>
             <a:endParaRPr lang="en-US"/>
           </a:p>
@@ -13688,7 +13688,7 @@
           <a:p>
             <a:fld id="{331BB52A-1119-4C62-AB93-D9C1ED94E901}" type="datetimeFigureOut">
               <a:rPr lang="en-US" smtClean="0"/>
-              <a:t>1/15/2026</a:t>
+              <a:t>1/17/2026</a:t>
             </a:fld>
             <a:endParaRPr lang="en-US"/>
           </a:p>
@@ -13971,7 +13971,7 @@
           <a:p>
             <a:fld id="{331BB52A-1119-4C62-AB93-D9C1ED94E901}" type="datetimeFigureOut">
               <a:rPr lang="en-US" smtClean="0"/>
-              <a:t>1/15/2026</a:t>
+              <a:t>1/17/2026</a:t>
             </a:fld>
             <a:endParaRPr lang="en-US"/>
           </a:p>
@@ -14262,7 +14262,7 @@
           <a:p>
             <a:fld id="{331BB52A-1119-4C62-AB93-D9C1ED94E901}" type="datetimeFigureOut">
               <a:rPr lang="en-US" smtClean="0"/>
-              <a:t>1/15/2026</a:t>
+              <a:t>1/17/2026</a:t>
             </a:fld>
             <a:endParaRPr lang="en-US"/>
           </a:p>
@@ -14833,7 +14833,7 @@
           <a:p>
             <a:fld id="{331BB52A-1119-4C62-AB93-D9C1ED94E901}" type="datetimeFigureOut">
               <a:rPr lang="en-US" smtClean="0"/>
-              <a:t>1/15/2026</a:t>
+              <a:t>1/17/2026</a:t>
             </a:fld>
             <a:endParaRPr lang="en-US"/>
           </a:p>
@@ -15515,7 +15515,7 @@
           <a:p>
             <a:fld id="{E778D16E-5DD9-40F0-A001-9BF546866B5B}" type="datetimeFigureOut">
               <a:rPr lang="en-US" smtClean="0"/>
-              <a:t>1/15/2026</a:t>
+              <a:t>1/17/2026</a:t>
             </a:fld>
             <a:endParaRPr lang="en-US"/>
           </a:p>
@@ -16083,7 +16083,7 @@
           <a:p>
             <a:fld id="{A7AC20F4-BAFA-45E4-A9C8-C2EC2EED0F56}" type="datetimeFigureOut">
               <a:rPr lang="en-US" smtClean="0"/>
-              <a:t>1/15/2026</a:t>
+              <a:t>1/17/2026</a:t>
             </a:fld>
             <a:endParaRPr lang="en-US"/>
           </a:p>
@@ -20074,7 +20074,7 @@
         </p:blipFill>
         <p:spPr>
           <a:xfrm>
-            <a:off x="6824473" y="1919641"/>
+            <a:off x="6835699" y="1919641"/>
             <a:ext cx="4579440" cy="2982560"/>
           </a:xfrm>
           <a:prstGeom prst="rect">

</xml_diff>